<commit_message>
async task can be canceled
</commit_message>
<xml_diff>
--- a/Icons/_RawConverter.pptx
+++ b/Icons/_RawConverter.pptx
@@ -110,6 +110,14 @@
     </p:ext>
   </p:extLst>
 </p:presentation>
+</file>
+
+<file path=ppt/revisionInfo.xml><?xml version="1.0" encoding="utf-8"?>
+<p1510:revInfo xmlns:a="http://schemas.openxmlformats.org/drawingml/2006/main" xmlns:r="http://schemas.openxmlformats.org/officeDocument/2006/relationships" xmlns:p1510="http://schemas.microsoft.com/office/powerpoint/2015/10/main">
+  <p1510:revLst>
+    <p1510:client id="{F3E72C9A-C72E-4712-A2C5-796C34B0A630}" v="1" dt="2021-06-23T21:17:07.315"/>
+  </p1510:revLst>
+</p1510:revInfo>
 </file>
 
 <file path=ppt/changesInfos/changesInfo1.xml><?xml version="1.0" encoding="utf-8"?>
@@ -363,6 +371,30 @@
     </pc:docChg>
   </pc:docChgLst>
   <pc:docChgLst>
+    <pc:chgData name="Ludwig Sembach" userId="f8993c4f9875f6c3" providerId="LiveId" clId="{F3E72C9A-C72E-4712-A2C5-796C34B0A630}"/>
+    <pc:docChg chg="modSld">
+      <pc:chgData name="Ludwig Sembach" userId="f8993c4f9875f6c3" providerId="LiveId" clId="{F3E72C9A-C72E-4712-A2C5-796C34B0A630}" dt="2021-06-23T21:17:31.439" v="3" actId="207"/>
+      <pc:docMkLst>
+        <pc:docMk/>
+      </pc:docMkLst>
+      <pc:sldChg chg="addSp modSp mod">
+        <pc:chgData name="Ludwig Sembach" userId="f8993c4f9875f6c3" providerId="LiveId" clId="{F3E72C9A-C72E-4712-A2C5-796C34B0A630}" dt="2021-06-23T21:17:31.439" v="3" actId="207"/>
+        <pc:sldMkLst>
+          <pc:docMk/>
+          <pc:sldMk cId="372925219" sldId="256"/>
+        </pc:sldMkLst>
+        <pc:picChg chg="add mod">
+          <ac:chgData name="Ludwig Sembach" userId="f8993c4f9875f6c3" providerId="LiveId" clId="{F3E72C9A-C72E-4712-A2C5-796C34B0A630}" dt="2021-06-23T21:17:31.439" v="3" actId="207"/>
+          <ac:picMkLst>
+            <pc:docMk/>
+            <pc:sldMk cId="372925219" sldId="256"/>
+            <ac:picMk id="6" creationId="{8146373F-8F72-46FC-919A-DC1D9D78DC52}"/>
+          </ac:picMkLst>
+        </pc:picChg>
+      </pc:sldChg>
+    </pc:docChg>
+  </pc:docChgLst>
+  <pc:docChgLst>
     <pc:chgData name="Ludwig Sembach" userId="f8993c4f9875f6c3" providerId="LiveId" clId="{81C93DCC-88F8-4639-A0ED-AE9601D8E849}"/>
     <pc:docChg chg="modSld">
       <pc:chgData name="Ludwig Sembach" userId="f8993c4f9875f6c3" providerId="LiveId" clId="{81C93DCC-88F8-4639-A0ED-AE9601D8E849}" dt="2021-06-01T17:01:07.510" v="8" actId="1076"/>
@@ -552,7 +584,7 @@
           <a:p>
             <a:fld id="{5A698ADF-B2CE-4AD9-A993-536894569C47}" type="datetimeFigureOut">
               <a:rPr lang="de-DE" smtClean="0"/>
-              <a:t>01.06.2021</a:t>
+              <a:t>23.06.2021</a:t>
             </a:fld>
             <a:endParaRPr lang="de-DE"/>
           </a:p>
@@ -750,7 +782,7 @@
           <a:p>
             <a:fld id="{5A698ADF-B2CE-4AD9-A993-536894569C47}" type="datetimeFigureOut">
               <a:rPr lang="de-DE" smtClean="0"/>
-              <a:t>01.06.2021</a:t>
+              <a:t>23.06.2021</a:t>
             </a:fld>
             <a:endParaRPr lang="de-DE"/>
           </a:p>
@@ -958,7 +990,7 @@
           <a:p>
             <a:fld id="{5A698ADF-B2CE-4AD9-A993-536894569C47}" type="datetimeFigureOut">
               <a:rPr lang="de-DE" smtClean="0"/>
-              <a:t>01.06.2021</a:t>
+              <a:t>23.06.2021</a:t>
             </a:fld>
             <a:endParaRPr lang="de-DE"/>
           </a:p>
@@ -1156,7 +1188,7 @@
           <a:p>
             <a:fld id="{5A698ADF-B2CE-4AD9-A993-536894569C47}" type="datetimeFigureOut">
               <a:rPr lang="de-DE" smtClean="0"/>
-              <a:t>01.06.2021</a:t>
+              <a:t>23.06.2021</a:t>
             </a:fld>
             <a:endParaRPr lang="de-DE"/>
           </a:p>
@@ -1431,7 +1463,7 @@
           <a:p>
             <a:fld id="{5A698ADF-B2CE-4AD9-A993-536894569C47}" type="datetimeFigureOut">
               <a:rPr lang="de-DE" smtClean="0"/>
-              <a:t>01.06.2021</a:t>
+              <a:t>23.06.2021</a:t>
             </a:fld>
             <a:endParaRPr lang="de-DE"/>
           </a:p>
@@ -1696,7 +1728,7 @@
           <a:p>
             <a:fld id="{5A698ADF-B2CE-4AD9-A993-536894569C47}" type="datetimeFigureOut">
               <a:rPr lang="de-DE" smtClean="0"/>
-              <a:t>01.06.2021</a:t>
+              <a:t>23.06.2021</a:t>
             </a:fld>
             <a:endParaRPr lang="de-DE"/>
           </a:p>
@@ -2108,7 +2140,7 @@
           <a:p>
             <a:fld id="{5A698ADF-B2CE-4AD9-A993-536894569C47}" type="datetimeFigureOut">
               <a:rPr lang="de-DE" smtClean="0"/>
-              <a:t>01.06.2021</a:t>
+              <a:t>23.06.2021</a:t>
             </a:fld>
             <a:endParaRPr lang="de-DE"/>
           </a:p>
@@ -2249,7 +2281,7 @@
           <a:p>
             <a:fld id="{5A698ADF-B2CE-4AD9-A993-536894569C47}" type="datetimeFigureOut">
               <a:rPr lang="de-DE" smtClean="0"/>
-              <a:t>01.06.2021</a:t>
+              <a:t>23.06.2021</a:t>
             </a:fld>
             <a:endParaRPr lang="de-DE"/>
           </a:p>
@@ -2362,7 +2394,7 @@
           <a:p>
             <a:fld id="{5A698ADF-B2CE-4AD9-A993-536894569C47}" type="datetimeFigureOut">
               <a:rPr lang="de-DE" smtClean="0"/>
-              <a:t>01.06.2021</a:t>
+              <a:t>23.06.2021</a:t>
             </a:fld>
             <a:endParaRPr lang="de-DE"/>
           </a:p>
@@ -2673,7 +2705,7 @@
           <a:p>
             <a:fld id="{5A698ADF-B2CE-4AD9-A993-536894569C47}" type="datetimeFigureOut">
               <a:rPr lang="de-DE" smtClean="0"/>
-              <a:t>01.06.2021</a:t>
+              <a:t>23.06.2021</a:t>
             </a:fld>
             <a:endParaRPr lang="de-DE"/>
           </a:p>
@@ -2961,7 +2993,7 @@
           <a:p>
             <a:fld id="{5A698ADF-B2CE-4AD9-A993-536894569C47}" type="datetimeFigureOut">
               <a:rPr lang="de-DE" smtClean="0"/>
-              <a:t>01.06.2021</a:t>
+              <a:t>23.06.2021</a:t>
             </a:fld>
             <a:endParaRPr lang="de-DE"/>
           </a:p>
@@ -3202,7 +3234,7 @@
           <a:p>
             <a:fld id="{5A698ADF-B2CE-4AD9-A993-536894569C47}" type="datetimeFigureOut">
               <a:rPr lang="de-DE" smtClean="0"/>
-              <a:t>01.06.2021</a:t>
+              <a:t>23.06.2021</a:t>
             </a:fld>
             <a:endParaRPr lang="de-DE"/>
           </a:p>
@@ -4499,6 +4531,45 @@
           </a:prstGeom>
         </p:spPr>
       </p:pic>
+      <p:pic>
+        <p:nvPicPr>
+          <p:cNvPr id="6" name="Grafik 5" descr="Schließen mit einfarbiger Füllung">
+            <a:extLst>
+              <a:ext uri="{FF2B5EF4-FFF2-40B4-BE49-F238E27FC236}">
+                <a16:creationId xmlns:a16="http://schemas.microsoft.com/office/drawing/2014/main" id="{8146373F-8F72-46FC-919A-DC1D9D78DC52}"/>
+              </a:ext>
+            </a:extLst>
+          </p:cNvPr>
+          <p:cNvPicPr>
+            <a:picLocks noChangeAspect="1"/>
+          </p:cNvPicPr>
+          <p:nvPr/>
+        </p:nvPicPr>
+        <p:blipFill>
+          <a:blip r:embed="rId15">
+            <a:extLst>
+              <a:ext uri="{28A0092B-C50C-407E-A947-70E740481C1C}">
+                <a14:useLocalDpi xmlns:a14="http://schemas.microsoft.com/office/drawing/2010/main" val="0"/>
+              </a:ext>
+              <a:ext uri="{96DAC541-7B7A-43D3-8B79-37D633B846F1}">
+                <asvg:svgBlip xmlns:asvg="http://schemas.microsoft.com/office/drawing/2016/SVG/main" r:embed="rId16"/>
+              </a:ext>
+            </a:extLst>
+          </a:blip>
+          <a:stretch>
+            <a:fillRect/>
+          </a:stretch>
+        </p:blipFill>
+        <p:spPr>
+          <a:xfrm>
+            <a:off x="5638800" y="2230419"/>
+            <a:ext cx="914400" cy="914400"/>
+          </a:xfrm>
+          <a:prstGeom prst="rect">
+            <a:avLst/>
+          </a:prstGeom>
+        </p:spPr>
+      </p:pic>
     </p:spTree>
     <p:extLst>
       <p:ext uri="{BB962C8B-B14F-4D97-AF65-F5344CB8AC3E}">

</xml_diff>